<commit_message>
Update to Responsive Design!
Finally!
</commit_message>
<xml_diff>
--- a/sprite_drafts/sprite making.pptx
+++ b/sprite_drafts/sprite making.pptx
@@ -260,7 +260,7 @@
           <a:p>
             <a:fld id="{8F100C3C-85D0-4B14-923A-2B7E189A1B4D}" type="datetimeFigureOut">
               <a:rPr lang="en-US" smtClean="0"/>
-              <a:t>12/25/2018</a:t>
+              <a:t>2/7/2019</a:t>
             </a:fld>
             <a:endParaRPr lang="en-US"/>
           </a:p>
@@ -458,7 +458,7 @@
           <a:p>
             <a:fld id="{8F100C3C-85D0-4B14-923A-2B7E189A1B4D}" type="datetimeFigureOut">
               <a:rPr lang="en-US" smtClean="0"/>
-              <a:t>12/25/2018</a:t>
+              <a:t>2/7/2019</a:t>
             </a:fld>
             <a:endParaRPr lang="en-US"/>
           </a:p>
@@ -666,7 +666,7 @@
           <a:p>
             <a:fld id="{8F100C3C-85D0-4B14-923A-2B7E189A1B4D}" type="datetimeFigureOut">
               <a:rPr lang="en-US" smtClean="0"/>
-              <a:t>12/25/2018</a:t>
+              <a:t>2/7/2019</a:t>
             </a:fld>
             <a:endParaRPr lang="en-US"/>
           </a:p>
@@ -864,7 +864,7 @@
           <a:p>
             <a:fld id="{8F100C3C-85D0-4B14-923A-2B7E189A1B4D}" type="datetimeFigureOut">
               <a:rPr lang="en-US" smtClean="0"/>
-              <a:t>12/25/2018</a:t>
+              <a:t>2/7/2019</a:t>
             </a:fld>
             <a:endParaRPr lang="en-US"/>
           </a:p>
@@ -1139,7 +1139,7 @@
           <a:p>
             <a:fld id="{8F100C3C-85D0-4B14-923A-2B7E189A1B4D}" type="datetimeFigureOut">
               <a:rPr lang="en-US" smtClean="0"/>
-              <a:t>12/25/2018</a:t>
+              <a:t>2/7/2019</a:t>
             </a:fld>
             <a:endParaRPr lang="en-US"/>
           </a:p>
@@ -1404,7 +1404,7 @@
           <a:p>
             <a:fld id="{8F100C3C-85D0-4B14-923A-2B7E189A1B4D}" type="datetimeFigureOut">
               <a:rPr lang="en-US" smtClean="0"/>
-              <a:t>12/25/2018</a:t>
+              <a:t>2/7/2019</a:t>
             </a:fld>
             <a:endParaRPr lang="en-US"/>
           </a:p>
@@ -1816,7 +1816,7 @@
           <a:p>
             <a:fld id="{8F100C3C-85D0-4B14-923A-2B7E189A1B4D}" type="datetimeFigureOut">
               <a:rPr lang="en-US" smtClean="0"/>
-              <a:t>12/25/2018</a:t>
+              <a:t>2/7/2019</a:t>
             </a:fld>
             <a:endParaRPr lang="en-US"/>
           </a:p>
@@ -1957,7 +1957,7 @@
           <a:p>
             <a:fld id="{8F100C3C-85D0-4B14-923A-2B7E189A1B4D}" type="datetimeFigureOut">
               <a:rPr lang="en-US" smtClean="0"/>
-              <a:t>12/25/2018</a:t>
+              <a:t>2/7/2019</a:t>
             </a:fld>
             <a:endParaRPr lang="en-US"/>
           </a:p>
@@ -2070,7 +2070,7 @@
           <a:p>
             <a:fld id="{8F100C3C-85D0-4B14-923A-2B7E189A1B4D}" type="datetimeFigureOut">
               <a:rPr lang="en-US" smtClean="0"/>
-              <a:t>12/25/2018</a:t>
+              <a:t>2/7/2019</a:t>
             </a:fld>
             <a:endParaRPr lang="en-US"/>
           </a:p>
@@ -2381,7 +2381,7 @@
           <a:p>
             <a:fld id="{8F100C3C-85D0-4B14-923A-2B7E189A1B4D}" type="datetimeFigureOut">
               <a:rPr lang="en-US" smtClean="0"/>
-              <a:t>12/25/2018</a:t>
+              <a:t>2/7/2019</a:t>
             </a:fld>
             <a:endParaRPr lang="en-US"/>
           </a:p>
@@ -2669,7 +2669,7 @@
           <a:p>
             <a:fld id="{8F100C3C-85D0-4B14-923A-2B7E189A1B4D}" type="datetimeFigureOut">
               <a:rPr lang="en-US" smtClean="0"/>
-              <a:t>12/25/2018</a:t>
+              <a:t>2/7/2019</a:t>
             </a:fld>
             <a:endParaRPr lang="en-US"/>
           </a:p>
@@ -2910,7 +2910,7 @@
           <a:p>
             <a:fld id="{8F100C3C-85D0-4B14-923A-2B7E189A1B4D}" type="datetimeFigureOut">
               <a:rPr lang="en-US" smtClean="0"/>
-              <a:t>12/25/2018</a:t>
+              <a:t>2/7/2019</a:t>
             </a:fld>
             <a:endParaRPr lang="en-US"/>
           </a:p>
@@ -3600,7 +3600,7 @@
         </p:nvGrpSpPr>
         <p:grpSpPr>
           <a:xfrm>
-            <a:off x="3825054" y="2057400"/>
+            <a:off x="1386639" y="2514600"/>
             <a:ext cx="1143000" cy="914400"/>
             <a:chOff x="378469" y="875783"/>
             <a:chExt cx="3414213" cy="3670852"/>
@@ -3681,7 +3681,7 @@
         </p:nvGrpSpPr>
         <p:grpSpPr>
           <a:xfrm>
-            <a:off x="7370111" y="2018634"/>
+            <a:off x="1958139" y="838420"/>
             <a:ext cx="1371600" cy="914480"/>
             <a:chOff x="7052539" y="1827933"/>
             <a:chExt cx="1085719" cy="914480"/>
@@ -3793,6 +3793,350 @@
           </p:spPr>
         </p:pic>
       </p:grpSp>
+      <p:grpSp>
+        <p:nvGrpSpPr>
+          <p:cNvPr id="22" name="Group 21">
+            <a:extLst>
+              <a:ext uri="{FF2B5EF4-FFF2-40B4-BE49-F238E27FC236}">
+                <a16:creationId xmlns:a16="http://schemas.microsoft.com/office/drawing/2014/main" id="{F05AAFB6-A0A5-420A-9D1E-7B7471511F5B}"/>
+              </a:ext>
+            </a:extLst>
+          </p:cNvPr>
+          <p:cNvGrpSpPr/>
+          <p:nvPr/>
+        </p:nvGrpSpPr>
+        <p:grpSpPr>
+          <a:xfrm>
+            <a:off x="4176405" y="2198356"/>
+            <a:ext cx="1375277" cy="914400"/>
+            <a:chOff x="6209978" y="1558066"/>
+            <a:chExt cx="2935251" cy="2461286"/>
+          </a:xfrm>
+        </p:grpSpPr>
+        <p:pic>
+          <p:nvPicPr>
+            <p:cNvPr id="4" name="Picture 3">
+              <a:extLst>
+                <a:ext uri="{FF2B5EF4-FFF2-40B4-BE49-F238E27FC236}">
+                  <a16:creationId xmlns:a16="http://schemas.microsoft.com/office/drawing/2014/main" id="{115285D4-26FC-46AD-ABB5-D276BA74C1A2}"/>
+                </a:ext>
+              </a:extLst>
+            </p:cNvPr>
+            <p:cNvPicPr>
+              <a:picLocks noChangeAspect="1"/>
+            </p:cNvPicPr>
+            <p:nvPr/>
+          </p:nvPicPr>
+          <p:blipFill rotWithShape="1">
+            <a:blip r:embed="rId5">
+              <a:clrChange>
+                <a:clrFrom>
+                  <a:srgbClr val="000000"/>
+                </a:clrFrom>
+                <a:clrTo>
+                  <a:srgbClr val="000000">
+                    <a:alpha val="0"/>
+                  </a:srgbClr>
+                </a:clrTo>
+              </a:clrChange>
+              <a:extLst>
+                <a:ext uri="{28A0092B-C50C-407E-A947-70E740481C1C}">
+                  <a14:useLocalDpi xmlns:a14="http://schemas.microsoft.com/office/drawing/2010/main" val="0"/>
+                </a:ext>
+              </a:extLst>
+            </a:blip>
+            <a:srcRect l="26773"/>
+            <a:stretch/>
+          </p:blipFill>
+          <p:spPr>
+            <a:xfrm>
+              <a:off x="6232670" y="1558066"/>
+              <a:ext cx="1577364" cy="1211683"/>
+            </a:xfrm>
+            <a:prstGeom prst="rect">
+              <a:avLst/>
+            </a:prstGeom>
+          </p:spPr>
+        </p:pic>
+        <p:pic>
+          <p:nvPicPr>
+            <p:cNvPr id="6" name="Picture 5">
+              <a:extLst>
+                <a:ext uri="{FF2B5EF4-FFF2-40B4-BE49-F238E27FC236}">
+                  <a16:creationId xmlns:a16="http://schemas.microsoft.com/office/drawing/2014/main" id="{B177B9AD-72E8-487E-ABA6-7E2B120DD9AD}"/>
+                </a:ext>
+              </a:extLst>
+            </p:cNvPr>
+            <p:cNvPicPr>
+              <a:picLocks noChangeAspect="1"/>
+            </p:cNvPicPr>
+            <p:nvPr/>
+          </p:nvPicPr>
+          <p:blipFill>
+            <a:blip r:embed="rId6">
+              <a:clrChange>
+                <a:clrFrom>
+                  <a:srgbClr val="000000"/>
+                </a:clrFrom>
+                <a:clrTo>
+                  <a:srgbClr val="000000">
+                    <a:alpha val="0"/>
+                  </a:srgbClr>
+                </a:clrTo>
+              </a:clrChange>
+              <a:extLst>
+                <a:ext uri="{28A0092B-C50C-407E-A947-70E740481C1C}">
+                  <a14:useLocalDpi xmlns:a14="http://schemas.microsoft.com/office/drawing/2010/main" val="0"/>
+                </a:ext>
+              </a:extLst>
+            </a:blip>
+            <a:stretch>
+              <a:fillRect/>
+            </a:stretch>
+          </p:blipFill>
+          <p:spPr>
+            <a:xfrm>
+              <a:off x="6558627" y="1568303"/>
+              <a:ext cx="2154103" cy="1211683"/>
+            </a:xfrm>
+            <a:prstGeom prst="rect">
+              <a:avLst/>
+            </a:prstGeom>
+          </p:spPr>
+        </p:pic>
+        <p:pic>
+          <p:nvPicPr>
+            <p:cNvPr id="8" name="Picture 7">
+              <a:extLst>
+                <a:ext uri="{FF2B5EF4-FFF2-40B4-BE49-F238E27FC236}">
+                  <a16:creationId xmlns:a16="http://schemas.microsoft.com/office/drawing/2014/main" id="{887B4C80-1F6B-46E8-AEF4-5D54508F32D3}"/>
+                </a:ext>
+              </a:extLst>
+            </p:cNvPr>
+            <p:cNvPicPr>
+              <a:picLocks noChangeAspect="1"/>
+            </p:cNvPicPr>
+            <p:nvPr/>
+          </p:nvPicPr>
+          <p:blipFill rotWithShape="1">
+            <a:blip r:embed="rId7">
+              <a:clrChange>
+                <a:clrFrom>
+                  <a:srgbClr val="000000"/>
+                </a:clrFrom>
+                <a:clrTo>
+                  <a:srgbClr val="000000">
+                    <a:alpha val="0"/>
+                  </a:srgbClr>
+                </a:clrTo>
+              </a:clrChange>
+              <a:extLst>
+                <a:ext uri="{28A0092B-C50C-407E-A947-70E740481C1C}">
+                  <a14:useLocalDpi xmlns:a14="http://schemas.microsoft.com/office/drawing/2010/main" val="0"/>
+                </a:ext>
+              </a:extLst>
+            </a:blip>
+            <a:srcRect r="24946"/>
+            <a:stretch/>
+          </p:blipFill>
+          <p:spPr>
+            <a:xfrm>
+              <a:off x="7485360" y="1558066"/>
+              <a:ext cx="1616737" cy="1211683"/>
+            </a:xfrm>
+            <a:prstGeom prst="rect">
+              <a:avLst/>
+            </a:prstGeom>
+          </p:spPr>
+        </p:pic>
+        <p:grpSp>
+          <p:nvGrpSpPr>
+            <p:cNvPr id="21" name="Group 20">
+              <a:extLst>
+                <a:ext uri="{FF2B5EF4-FFF2-40B4-BE49-F238E27FC236}">
+                  <a16:creationId xmlns:a16="http://schemas.microsoft.com/office/drawing/2014/main" id="{A43AF441-8B48-4BE4-AD0B-BDABE2D7FF3D}"/>
+                </a:ext>
+              </a:extLst>
+            </p:cNvPr>
+            <p:cNvGrpSpPr/>
+            <p:nvPr/>
+          </p:nvGrpSpPr>
+          <p:grpSpPr>
+            <a:xfrm>
+              <a:off x="6209978" y="2797432"/>
+              <a:ext cx="2935251" cy="1221920"/>
+              <a:chOff x="6209978" y="2797432"/>
+              <a:chExt cx="2935251" cy="1221920"/>
+            </a:xfrm>
+          </p:grpSpPr>
+          <p:pic>
+            <p:nvPicPr>
+              <p:cNvPr id="12" name="Picture 11">
+                <a:extLst>
+                  <a:ext uri="{FF2B5EF4-FFF2-40B4-BE49-F238E27FC236}">
+                    <a16:creationId xmlns:a16="http://schemas.microsoft.com/office/drawing/2014/main" id="{7F17B967-3C62-49E6-9364-420E8FD40745}"/>
+                  </a:ext>
+                </a:extLst>
+              </p:cNvPr>
+              <p:cNvPicPr>
+                <a:picLocks noChangeAspect="1"/>
+              </p:cNvPicPr>
+              <p:nvPr/>
+            </p:nvPicPr>
+            <p:blipFill rotWithShape="1">
+              <a:blip r:embed="rId8">
+                <a:clrChange>
+                  <a:clrFrom>
+                    <a:srgbClr val="000000"/>
+                  </a:clrFrom>
+                  <a:clrTo>
+                    <a:srgbClr val="000000">
+                      <a:alpha val="0"/>
+                    </a:srgbClr>
+                  </a:clrTo>
+                </a:clrChange>
+                <a:extLst>
+                  <a:ext uri="{28A0092B-C50C-407E-A947-70E740481C1C}">
+                    <a14:useLocalDpi xmlns:a14="http://schemas.microsoft.com/office/drawing/2010/main" val="0"/>
+                  </a:ext>
+                </a:extLst>
+              </a:blip>
+              <a:srcRect l="25937"/>
+              <a:stretch/>
+            </p:blipFill>
+            <p:spPr>
+              <a:xfrm>
+                <a:off x="6209978" y="2807669"/>
+                <a:ext cx="1595388" cy="1211683"/>
+              </a:xfrm>
+              <a:prstGeom prst="rect">
+                <a:avLst/>
+              </a:prstGeom>
+            </p:spPr>
+          </p:pic>
+          <p:pic>
+            <p:nvPicPr>
+              <p:cNvPr id="14" name="Picture 13">
+                <a:extLst>
+                  <a:ext uri="{FF2B5EF4-FFF2-40B4-BE49-F238E27FC236}">
+                    <a16:creationId xmlns:a16="http://schemas.microsoft.com/office/drawing/2014/main" id="{C91D3952-97F1-4942-9418-BC02532D2B8F}"/>
+                  </a:ext>
+                </a:extLst>
+              </p:cNvPr>
+              <p:cNvPicPr>
+                <a:picLocks noChangeAspect="1"/>
+              </p:cNvPicPr>
+              <p:nvPr/>
+            </p:nvPicPr>
+            <p:blipFill>
+              <a:blip r:embed="rId9">
+                <a:clrChange>
+                  <a:clrFrom>
+                    <a:srgbClr val="000000"/>
+                  </a:clrFrom>
+                  <a:clrTo>
+                    <a:srgbClr val="000000">
+                      <a:alpha val="0"/>
+                    </a:srgbClr>
+                  </a:clrTo>
+                </a:clrChange>
+                <a:extLst>
+                  <a:ext uri="{28A0092B-C50C-407E-A947-70E740481C1C}">
+                    <a14:useLocalDpi xmlns:a14="http://schemas.microsoft.com/office/drawing/2010/main" val="0"/>
+                  </a:ext>
+                </a:extLst>
+              </a:blip>
+              <a:stretch>
+                <a:fillRect/>
+              </a:stretch>
+            </p:blipFill>
+            <p:spPr>
+              <a:xfrm>
+                <a:off x="6600552" y="2797432"/>
+                <a:ext cx="2154103" cy="1211683"/>
+              </a:xfrm>
+              <a:prstGeom prst="rect">
+                <a:avLst/>
+              </a:prstGeom>
+            </p:spPr>
+          </p:pic>
+          <p:pic>
+            <p:nvPicPr>
+              <p:cNvPr id="17" name="Picture 16">
+                <a:extLst>
+                  <a:ext uri="{FF2B5EF4-FFF2-40B4-BE49-F238E27FC236}">
+                    <a16:creationId xmlns:a16="http://schemas.microsoft.com/office/drawing/2014/main" id="{9E839909-6654-497D-B459-9585D581561A}"/>
+                  </a:ext>
+                </a:extLst>
+              </p:cNvPr>
+              <p:cNvPicPr>
+                <a:picLocks noChangeAspect="1"/>
+              </p:cNvPicPr>
+              <p:nvPr/>
+            </p:nvPicPr>
+            <p:blipFill rotWithShape="1">
+              <a:blip r:embed="rId10">
+                <a:clrChange>
+                  <a:clrFrom>
+                    <a:srgbClr val="000000"/>
+                  </a:clrFrom>
+                  <a:clrTo>
+                    <a:srgbClr val="000000">
+                      <a:alpha val="0"/>
+                    </a:srgbClr>
+                  </a:clrTo>
+                </a:clrChange>
+                <a:extLst>
+                  <a:ext uri="{28A0092B-C50C-407E-A947-70E740481C1C}">
+                    <a14:useLocalDpi xmlns:a14="http://schemas.microsoft.com/office/drawing/2010/main" val="0"/>
+                  </a:ext>
+                </a:extLst>
+              </a:blip>
+              <a:srcRect r="22045"/>
+              <a:stretch/>
+            </p:blipFill>
+            <p:spPr>
+              <a:xfrm>
+                <a:off x="7465995" y="2807669"/>
+                <a:ext cx="1679234" cy="1211683"/>
+              </a:xfrm>
+              <a:prstGeom prst="rect">
+                <a:avLst/>
+              </a:prstGeom>
+            </p:spPr>
+          </p:pic>
+        </p:grpSp>
+      </p:grpSp>
+      <p:pic>
+        <p:nvPicPr>
+          <p:cNvPr id="35" name="Picture 34">
+            <a:extLst>
+              <a:ext uri="{FF2B5EF4-FFF2-40B4-BE49-F238E27FC236}">
+                <a16:creationId xmlns:a16="http://schemas.microsoft.com/office/drawing/2014/main" id="{572ABB75-9B20-4090-A126-788B96409D6E}"/>
+              </a:ext>
+            </a:extLst>
+          </p:cNvPr>
+          <p:cNvPicPr>
+            <a:picLocks noChangeAspect="1"/>
+          </p:cNvPicPr>
+          <p:nvPr/>
+        </p:nvPicPr>
+        <p:blipFill>
+          <a:blip r:embed="rId11"/>
+          <a:stretch>
+            <a:fillRect/>
+          </a:stretch>
+        </p:blipFill>
+        <p:spPr>
+          <a:xfrm>
+            <a:off x="8150291" y="1953446"/>
+            <a:ext cx="1380744" cy="916423"/>
+          </a:xfrm>
+          <a:prstGeom prst="rect">
+            <a:avLst/>
+          </a:prstGeom>
+        </p:spPr>
+      </p:pic>
     </p:spTree>
     <p:extLst>
       <p:ext uri="{BB962C8B-B14F-4D97-AF65-F5344CB8AC3E}">

</xml_diff>